<commit_message>
stats in search 디렉토리 구분
</commit_message>
<xml_diff>
--- a/stats_in_search/stats_in_search.pptx
+++ b/stats_in_search/stats_in_search.pptx
@@ -12,6 +12,13 @@
     <p:sldId id="260" r:id="rId6"/>
     <p:sldId id="261" r:id="rId7"/>
     <p:sldId id="262" r:id="rId8"/>
+    <p:sldId id="263" r:id="rId9"/>
+    <p:sldId id="270" r:id="rId10"/>
+    <p:sldId id="264" r:id="rId11"/>
+    <p:sldId id="265" r:id="rId12"/>
+    <p:sldId id="267" r:id="rId13"/>
+    <p:sldId id="268" r:id="rId14"/>
+    <p:sldId id="269" r:id="rId15"/>
   </p:sldIdLst>
   <p:sldSz cx="12192000" cy="6858000"/>
   <p:notesSz cx="6858000" cy="9144000"/>
@@ -110,6 +117,11 @@
       </a:defRPr>
     </a:lvl9pPr>
   </p:defaultTextStyle>
+  <p:extLst>
+    <p:ext uri="{EFAFB233-063F-42B5-8137-9DF3F51BA10A}">
+      <p15:sldGuideLst xmlns:p15="http://schemas.microsoft.com/office/powerpoint/2012/main"/>
+    </p:ext>
+  </p:extLst>
 </p:presentation>
 </file>
 
@@ -244,7 +256,7 @@
           <a:p>
             <a:fld id="{A0B905E5-0DB4-487C-897B-194EE04DE831}" type="datetimeFigureOut">
               <a:rPr lang="ko-KR" altLang="en-US" smtClean="0"/>
-              <a:t>2020-01-22</a:t>
+              <a:t>2020-01-28</a:t>
             </a:fld>
             <a:endParaRPr lang="ko-KR" altLang="en-US"/>
           </a:p>
@@ -414,7 +426,7 @@
           <a:p>
             <a:fld id="{A0B905E5-0DB4-487C-897B-194EE04DE831}" type="datetimeFigureOut">
               <a:rPr lang="ko-KR" altLang="en-US" smtClean="0"/>
-              <a:t>2020-01-22</a:t>
+              <a:t>2020-01-28</a:t>
             </a:fld>
             <a:endParaRPr lang="ko-KR" altLang="en-US"/>
           </a:p>
@@ -594,7 +606,7 @@
           <a:p>
             <a:fld id="{A0B905E5-0DB4-487C-897B-194EE04DE831}" type="datetimeFigureOut">
               <a:rPr lang="ko-KR" altLang="en-US" smtClean="0"/>
-              <a:t>2020-01-22</a:t>
+              <a:t>2020-01-28</a:t>
             </a:fld>
             <a:endParaRPr lang="ko-KR" altLang="en-US"/>
           </a:p>
@@ -764,7 +776,7 @@
           <a:p>
             <a:fld id="{A0B905E5-0DB4-487C-897B-194EE04DE831}" type="datetimeFigureOut">
               <a:rPr lang="ko-KR" altLang="en-US" smtClean="0"/>
-              <a:t>2020-01-22</a:t>
+              <a:t>2020-01-28</a:t>
             </a:fld>
             <a:endParaRPr lang="ko-KR" altLang="en-US"/>
           </a:p>
@@ -1010,7 +1022,7 @@
           <a:p>
             <a:fld id="{A0B905E5-0DB4-487C-897B-194EE04DE831}" type="datetimeFigureOut">
               <a:rPr lang="ko-KR" altLang="en-US" smtClean="0"/>
-              <a:t>2020-01-22</a:t>
+              <a:t>2020-01-28</a:t>
             </a:fld>
             <a:endParaRPr lang="ko-KR" altLang="en-US"/>
           </a:p>
@@ -1242,7 +1254,7 @@
           <a:p>
             <a:fld id="{A0B905E5-0DB4-487C-897B-194EE04DE831}" type="datetimeFigureOut">
               <a:rPr lang="ko-KR" altLang="en-US" smtClean="0"/>
-              <a:t>2020-01-22</a:t>
+              <a:t>2020-01-28</a:t>
             </a:fld>
             <a:endParaRPr lang="ko-KR" altLang="en-US"/>
           </a:p>
@@ -1609,7 +1621,7 @@
           <a:p>
             <a:fld id="{A0B905E5-0DB4-487C-897B-194EE04DE831}" type="datetimeFigureOut">
               <a:rPr lang="ko-KR" altLang="en-US" smtClean="0"/>
-              <a:t>2020-01-22</a:t>
+              <a:t>2020-01-28</a:t>
             </a:fld>
             <a:endParaRPr lang="ko-KR" altLang="en-US"/>
           </a:p>
@@ -1727,7 +1739,7 @@
           <a:p>
             <a:fld id="{A0B905E5-0DB4-487C-897B-194EE04DE831}" type="datetimeFigureOut">
               <a:rPr lang="ko-KR" altLang="en-US" smtClean="0"/>
-              <a:t>2020-01-22</a:t>
+              <a:t>2020-01-28</a:t>
             </a:fld>
             <a:endParaRPr lang="ko-KR" altLang="en-US"/>
           </a:p>
@@ -1822,7 +1834,7 @@
           <a:p>
             <a:fld id="{A0B905E5-0DB4-487C-897B-194EE04DE831}" type="datetimeFigureOut">
               <a:rPr lang="ko-KR" altLang="en-US" smtClean="0"/>
-              <a:t>2020-01-22</a:t>
+              <a:t>2020-01-28</a:t>
             </a:fld>
             <a:endParaRPr lang="ko-KR" altLang="en-US"/>
           </a:p>
@@ -2099,7 +2111,7 @@
           <a:p>
             <a:fld id="{A0B905E5-0DB4-487C-897B-194EE04DE831}" type="datetimeFigureOut">
               <a:rPr lang="ko-KR" altLang="en-US" smtClean="0"/>
-              <a:t>2020-01-22</a:t>
+              <a:t>2020-01-28</a:t>
             </a:fld>
             <a:endParaRPr lang="ko-KR" altLang="en-US"/>
           </a:p>
@@ -2352,7 +2364,7 @@
           <a:p>
             <a:fld id="{A0B905E5-0DB4-487C-897B-194EE04DE831}" type="datetimeFigureOut">
               <a:rPr lang="ko-KR" altLang="en-US" smtClean="0"/>
-              <a:t>2020-01-22</a:t>
+              <a:t>2020-01-28</a:t>
             </a:fld>
             <a:endParaRPr lang="ko-KR" altLang="en-US"/>
           </a:p>
@@ -2565,7 +2577,7 @@
           <a:p>
             <a:fld id="{A0B905E5-0DB4-487C-897B-194EE04DE831}" type="datetimeFigureOut">
               <a:rPr lang="ko-KR" altLang="en-US" smtClean="0"/>
-              <a:t>2020-01-22</a:t>
+              <a:t>2020-01-28</a:t>
             </a:fld>
             <a:endParaRPr lang="ko-KR" altLang="en-US"/>
           </a:p>
@@ -3037,6 +3049,338 @@
 </p:sld>
 </file>
 
+<file path=ppt/slides/slide10.xml><?xml version="1.0" encoding="utf-8"?>
+<p:sld xmlns:a="http://schemas.openxmlformats.org/drawingml/2006/main" xmlns:r="http://schemas.openxmlformats.org/officeDocument/2006/relationships" xmlns:p="http://schemas.openxmlformats.org/presentationml/2006/main">
+  <p:cSld>
+    <p:spTree>
+      <p:nvGrpSpPr>
+        <p:cNvPr id="1" name=""/>
+        <p:cNvGrpSpPr/>
+        <p:nvPr/>
+      </p:nvGrpSpPr>
+      <p:grpSpPr>
+        <a:xfrm>
+          <a:off x="0" y="0"/>
+          <a:ext cx="0" cy="0"/>
+          <a:chOff x="0" y="0"/>
+          <a:chExt cx="0" cy="0"/>
+        </a:xfrm>
+      </p:grpSpPr>
+      <p:pic>
+        <p:nvPicPr>
+          <p:cNvPr id="2" name="그림 1"/>
+          <p:cNvPicPr>
+            <a:picLocks noChangeAspect="1"/>
+          </p:cNvPicPr>
+          <p:nvPr/>
+        </p:nvPicPr>
+        <p:blipFill rotWithShape="1">
+          <a:blip r:embed="rId2"/>
+          <a:srcRect t="10000"/>
+          <a:stretch/>
+        </p:blipFill>
+        <p:spPr>
+          <a:xfrm>
+            <a:off x="313267" y="440266"/>
+            <a:ext cx="11645538" cy="5677200"/>
+          </a:xfrm>
+          <a:prstGeom prst="rect">
+            <a:avLst/>
+          </a:prstGeom>
+          <a:ln>
+            <a:solidFill>
+              <a:schemeClr val="tx1"/>
+            </a:solidFill>
+          </a:ln>
+        </p:spPr>
+      </p:pic>
+    </p:spTree>
+    <p:extLst>
+      <p:ext uri="{BB962C8B-B14F-4D97-AF65-F5344CB8AC3E}">
+        <p14:creationId xmlns:p14="http://schemas.microsoft.com/office/powerpoint/2010/main" val="1951759688"/>
+      </p:ext>
+    </p:extLst>
+  </p:cSld>
+  <p:clrMapOvr>
+    <a:masterClrMapping/>
+  </p:clrMapOvr>
+</p:sld>
+</file>
+
+<file path=ppt/slides/slide11.xml><?xml version="1.0" encoding="utf-8"?>
+<p:sld xmlns:a="http://schemas.openxmlformats.org/drawingml/2006/main" xmlns:r="http://schemas.openxmlformats.org/officeDocument/2006/relationships" xmlns:p="http://schemas.openxmlformats.org/presentationml/2006/main">
+  <p:cSld>
+    <p:spTree>
+      <p:nvGrpSpPr>
+        <p:cNvPr id="1" name=""/>
+        <p:cNvGrpSpPr/>
+        <p:nvPr/>
+      </p:nvGrpSpPr>
+      <p:grpSpPr>
+        <a:xfrm>
+          <a:off x="0" y="0"/>
+          <a:ext cx="0" cy="0"/>
+          <a:chOff x="0" y="0"/>
+          <a:chExt cx="0" cy="0"/>
+        </a:xfrm>
+      </p:grpSpPr>
+      <p:pic>
+        <p:nvPicPr>
+          <p:cNvPr id="3" name="그림 2"/>
+          <p:cNvPicPr>
+            <a:picLocks noChangeAspect="1"/>
+          </p:cNvPicPr>
+          <p:nvPr/>
+        </p:nvPicPr>
+        <p:blipFill rotWithShape="1">
+          <a:blip r:embed="rId2"/>
+          <a:srcRect t="9872"/>
+          <a:stretch/>
+        </p:blipFill>
+        <p:spPr>
+          <a:xfrm>
+            <a:off x="321733" y="609599"/>
+            <a:ext cx="11628972" cy="5677200"/>
+          </a:xfrm>
+          <a:prstGeom prst="rect">
+            <a:avLst/>
+          </a:prstGeom>
+          <a:ln>
+            <a:solidFill>
+              <a:schemeClr val="tx1"/>
+            </a:solidFill>
+          </a:ln>
+        </p:spPr>
+      </p:pic>
+    </p:spTree>
+    <p:extLst>
+      <p:ext uri="{BB962C8B-B14F-4D97-AF65-F5344CB8AC3E}">
+        <p14:creationId xmlns:p14="http://schemas.microsoft.com/office/powerpoint/2010/main" val="2018896965"/>
+      </p:ext>
+    </p:extLst>
+  </p:cSld>
+  <p:clrMapOvr>
+    <a:masterClrMapping/>
+  </p:clrMapOvr>
+</p:sld>
+</file>
+
+<file path=ppt/slides/slide12.xml><?xml version="1.0" encoding="utf-8"?>
+<p:sld xmlns:a="http://schemas.openxmlformats.org/drawingml/2006/main" xmlns:r="http://schemas.openxmlformats.org/officeDocument/2006/relationships" xmlns:p="http://schemas.openxmlformats.org/presentationml/2006/main">
+  <p:cSld>
+    <p:spTree>
+      <p:nvGrpSpPr>
+        <p:cNvPr id="1" name=""/>
+        <p:cNvGrpSpPr/>
+        <p:nvPr/>
+      </p:nvGrpSpPr>
+      <p:grpSpPr>
+        <a:xfrm>
+          <a:off x="0" y="0"/>
+          <a:ext cx="0" cy="0"/>
+          <a:chOff x="0" y="0"/>
+          <a:chExt cx="0" cy="0"/>
+        </a:xfrm>
+      </p:grpSpPr>
+      <p:pic>
+        <p:nvPicPr>
+          <p:cNvPr id="2" name="그림 1"/>
+          <p:cNvPicPr>
+            <a:picLocks noChangeAspect="1"/>
+          </p:cNvPicPr>
+          <p:nvPr/>
+        </p:nvPicPr>
+        <p:blipFill rotWithShape="1">
+          <a:blip r:embed="rId2"/>
+          <a:srcRect t="10000"/>
+          <a:stretch/>
+        </p:blipFill>
+        <p:spPr>
+          <a:xfrm>
+            <a:off x="254000" y="567266"/>
+            <a:ext cx="11645538" cy="5677200"/>
+          </a:xfrm>
+          <a:prstGeom prst="rect">
+            <a:avLst/>
+          </a:prstGeom>
+          <a:ln>
+            <a:solidFill>
+              <a:schemeClr val="tx1"/>
+            </a:solidFill>
+          </a:ln>
+        </p:spPr>
+      </p:pic>
+    </p:spTree>
+    <p:extLst>
+      <p:ext uri="{BB962C8B-B14F-4D97-AF65-F5344CB8AC3E}">
+        <p14:creationId xmlns:p14="http://schemas.microsoft.com/office/powerpoint/2010/main" val="2712746730"/>
+      </p:ext>
+    </p:extLst>
+  </p:cSld>
+  <p:clrMapOvr>
+    <a:masterClrMapping/>
+  </p:clrMapOvr>
+</p:sld>
+</file>
+
+<file path=ppt/slides/slide13.xml><?xml version="1.0" encoding="utf-8"?>
+<p:sld xmlns:a="http://schemas.openxmlformats.org/drawingml/2006/main" xmlns:r="http://schemas.openxmlformats.org/officeDocument/2006/relationships" xmlns:p="http://schemas.openxmlformats.org/presentationml/2006/main">
+  <p:cSld>
+    <p:spTree>
+      <p:nvGrpSpPr>
+        <p:cNvPr id="1" name=""/>
+        <p:cNvGrpSpPr/>
+        <p:nvPr/>
+      </p:nvGrpSpPr>
+      <p:grpSpPr>
+        <a:xfrm>
+          <a:off x="0" y="0"/>
+          <a:ext cx="0" cy="0"/>
+          <a:chOff x="0" y="0"/>
+          <a:chExt cx="0" cy="0"/>
+        </a:xfrm>
+      </p:grpSpPr>
+      <p:pic>
+        <p:nvPicPr>
+          <p:cNvPr id="3" name="그림 2"/>
+          <p:cNvPicPr>
+            <a:picLocks noChangeAspect="1"/>
+          </p:cNvPicPr>
+          <p:nvPr/>
+        </p:nvPicPr>
+        <p:blipFill>
+          <a:blip r:embed="rId2"/>
+          <a:stretch>
+            <a:fillRect/>
+          </a:stretch>
+        </p:blipFill>
+        <p:spPr>
+          <a:xfrm>
+            <a:off x="1847847" y="2070100"/>
+            <a:ext cx="6667500" cy="1143000"/>
+          </a:xfrm>
+          <a:prstGeom prst="rect">
+            <a:avLst/>
+          </a:prstGeom>
+        </p:spPr>
+      </p:pic>
+      <p:sp>
+        <p:nvSpPr>
+          <p:cNvPr id="4" name="직사각형 3"/>
+          <p:cNvSpPr/>
+          <p:nvPr/>
+        </p:nvSpPr>
+        <p:spPr>
+          <a:xfrm>
+            <a:off x="4266273" y="2840566"/>
+            <a:ext cx="915324" cy="372534"/>
+          </a:xfrm>
+          <a:prstGeom prst="rect">
+            <a:avLst/>
+          </a:prstGeom>
+          <a:noFill/>
+          <a:ln w="19050">
+            <a:solidFill>
+              <a:schemeClr val="accent2"/>
+            </a:solidFill>
+          </a:ln>
+        </p:spPr>
+        <p:style>
+          <a:lnRef idx="2">
+            <a:schemeClr val="accent1">
+              <a:shade val="50000"/>
+            </a:schemeClr>
+          </a:lnRef>
+          <a:fillRef idx="1">
+            <a:schemeClr val="accent1"/>
+          </a:fillRef>
+          <a:effectRef idx="0">
+            <a:schemeClr val="accent1"/>
+          </a:effectRef>
+          <a:fontRef idx="minor">
+            <a:schemeClr val="lt1"/>
+          </a:fontRef>
+        </p:style>
+        <p:txBody>
+          <a:bodyPr rtlCol="0" anchor="ctr"/>
+          <a:lstStyle/>
+          <a:p>
+            <a:pPr algn="ctr"/>
+            <a:endParaRPr lang="ko-KR" altLang="en-US"/>
+          </a:p>
+        </p:txBody>
+      </p:sp>
+    </p:spTree>
+    <p:extLst>
+      <p:ext uri="{BB962C8B-B14F-4D97-AF65-F5344CB8AC3E}">
+        <p14:creationId xmlns:p14="http://schemas.microsoft.com/office/powerpoint/2010/main" val="3248594408"/>
+      </p:ext>
+    </p:extLst>
+  </p:cSld>
+  <p:clrMapOvr>
+    <a:masterClrMapping/>
+  </p:clrMapOvr>
+</p:sld>
+</file>
+
+<file path=ppt/slides/slide14.xml><?xml version="1.0" encoding="utf-8"?>
+<p:sld xmlns:a="http://schemas.openxmlformats.org/drawingml/2006/main" xmlns:r="http://schemas.openxmlformats.org/officeDocument/2006/relationships" xmlns:p="http://schemas.openxmlformats.org/presentationml/2006/main">
+  <p:cSld>
+    <p:spTree>
+      <p:nvGrpSpPr>
+        <p:cNvPr id="1" name=""/>
+        <p:cNvGrpSpPr/>
+        <p:nvPr/>
+      </p:nvGrpSpPr>
+      <p:grpSpPr>
+        <a:xfrm>
+          <a:off x="0" y="0"/>
+          <a:ext cx="0" cy="0"/>
+          <a:chOff x="0" y="0"/>
+          <a:chExt cx="0" cy="0"/>
+        </a:xfrm>
+      </p:grpSpPr>
+      <p:pic>
+        <p:nvPicPr>
+          <p:cNvPr id="2" name="그림 1"/>
+          <p:cNvPicPr>
+            <a:picLocks noChangeAspect="1"/>
+          </p:cNvPicPr>
+          <p:nvPr/>
+        </p:nvPicPr>
+        <p:blipFill rotWithShape="1">
+          <a:blip r:embed="rId2"/>
+          <a:srcRect t="9872"/>
+          <a:stretch/>
+        </p:blipFill>
+        <p:spPr>
+          <a:xfrm>
+            <a:off x="194733" y="406399"/>
+            <a:ext cx="11628972" cy="5677200"/>
+          </a:xfrm>
+          <a:prstGeom prst="rect">
+            <a:avLst/>
+          </a:prstGeom>
+          <a:ln>
+            <a:solidFill>
+              <a:schemeClr val="tx1"/>
+            </a:solidFill>
+          </a:ln>
+        </p:spPr>
+      </p:pic>
+    </p:spTree>
+    <p:extLst>
+      <p:ext uri="{BB962C8B-B14F-4D97-AF65-F5344CB8AC3E}">
+        <p14:creationId xmlns:p14="http://schemas.microsoft.com/office/powerpoint/2010/main" val="1529486667"/>
+      </p:ext>
+    </p:extLst>
+  </p:cSld>
+  <p:clrMapOvr>
+    <a:masterClrMapping/>
+  </p:clrMapOvr>
+</p:sld>
+</file>
+
 <file path=ppt/slides/slide2.xml><?xml version="1.0" encoding="utf-8"?>
 <p:sld xmlns:a="http://schemas.openxmlformats.org/drawingml/2006/main" xmlns:r="http://schemas.openxmlformats.org/officeDocument/2006/relationships" xmlns:p="http://schemas.openxmlformats.org/presentationml/2006/main">
   <p:cSld>
@@ -3652,6 +3996,152 @@
     <p:extLst>
       <p:ext uri="{BB962C8B-B14F-4D97-AF65-F5344CB8AC3E}">
         <p14:creationId xmlns:p14="http://schemas.microsoft.com/office/powerpoint/2010/main" val="3929491111"/>
+      </p:ext>
+    </p:extLst>
+  </p:cSld>
+  <p:clrMapOvr>
+    <a:masterClrMapping/>
+  </p:clrMapOvr>
+</p:sld>
+</file>
+
+<file path=ppt/slides/slide8.xml><?xml version="1.0" encoding="utf-8"?>
+<p:sld xmlns:a="http://schemas.openxmlformats.org/drawingml/2006/main" xmlns:r="http://schemas.openxmlformats.org/officeDocument/2006/relationships" xmlns:p="http://schemas.openxmlformats.org/presentationml/2006/main">
+  <p:cSld>
+    <p:spTree>
+      <p:nvGrpSpPr>
+        <p:cNvPr id="1" name=""/>
+        <p:cNvGrpSpPr/>
+        <p:nvPr/>
+      </p:nvGrpSpPr>
+      <p:grpSpPr>
+        <a:xfrm>
+          <a:off x="0" y="0"/>
+          <a:ext cx="0" cy="0"/>
+          <a:chOff x="0" y="0"/>
+          <a:chExt cx="0" cy="0"/>
+        </a:xfrm>
+      </p:grpSpPr>
+      <p:sp>
+        <p:nvSpPr>
+          <p:cNvPr id="2" name="제목 1"/>
+          <p:cNvSpPr>
+            <a:spLocks noGrp="1"/>
+          </p:cNvSpPr>
+          <p:nvPr>
+            <p:ph type="ctrTitle"/>
+          </p:nvPr>
+        </p:nvSpPr>
+        <p:spPr/>
+        <p:txBody>
+          <a:bodyPr/>
+          <a:lstStyle/>
+          <a:p>
+            <a:r>
+              <a:rPr lang="ko-KR" altLang="en-US" dirty="0"/>
+              <a:t>영</a:t>
+            </a:r>
+            <a:r>
+              <a:rPr lang="ko-KR" altLang="en-US" dirty="0" smtClean="0"/>
+              <a:t>문</a:t>
+            </a:r>
+            <a:r>
+              <a:rPr lang="en-US" altLang="ko-KR" dirty="0" smtClean="0"/>
+              <a:t>(</a:t>
+            </a:r>
+            <a:r>
+              <a:rPr lang="en-US" altLang="ko-KR" dirty="0" err="1" smtClean="0"/>
+              <a:t>En</a:t>
+            </a:r>
+            <a:r>
+              <a:rPr lang="en-US" altLang="ko-KR" dirty="0" smtClean="0"/>
+              <a:t>)</a:t>
+            </a:r>
+            <a:endParaRPr lang="ko-KR" altLang="en-US" dirty="0"/>
+          </a:p>
+        </p:txBody>
+      </p:sp>
+      <p:sp>
+        <p:nvSpPr>
+          <p:cNvPr id="3" name="부제목 2"/>
+          <p:cNvSpPr>
+            <a:spLocks noGrp="1"/>
+          </p:cNvSpPr>
+          <p:nvPr>
+            <p:ph type="subTitle" idx="1"/>
+          </p:nvPr>
+        </p:nvSpPr>
+        <p:spPr/>
+        <p:txBody>
+          <a:bodyPr/>
+          <a:lstStyle/>
+          <a:p>
+            <a:endParaRPr lang="ko-KR" altLang="en-US"/>
+          </a:p>
+        </p:txBody>
+      </p:sp>
+    </p:spTree>
+    <p:extLst>
+      <p:ext uri="{BB962C8B-B14F-4D97-AF65-F5344CB8AC3E}">
+        <p14:creationId xmlns:p14="http://schemas.microsoft.com/office/powerpoint/2010/main" val="778593894"/>
+      </p:ext>
+    </p:extLst>
+  </p:cSld>
+  <p:clrMapOvr>
+    <a:masterClrMapping/>
+  </p:clrMapOvr>
+</p:sld>
+</file>
+
+<file path=ppt/slides/slide9.xml><?xml version="1.0" encoding="utf-8"?>
+<p:sld xmlns:a="http://schemas.openxmlformats.org/drawingml/2006/main" xmlns:r="http://schemas.openxmlformats.org/officeDocument/2006/relationships" xmlns:p="http://schemas.openxmlformats.org/presentationml/2006/main">
+  <p:cSld>
+    <p:spTree>
+      <p:nvGrpSpPr>
+        <p:cNvPr id="1" name=""/>
+        <p:cNvGrpSpPr/>
+        <p:nvPr/>
+      </p:nvGrpSpPr>
+      <p:grpSpPr>
+        <a:xfrm>
+          <a:off x="0" y="0"/>
+          <a:ext cx="0" cy="0"/>
+          <a:chOff x="0" y="0"/>
+          <a:chExt cx="0" cy="0"/>
+        </a:xfrm>
+      </p:grpSpPr>
+      <p:pic>
+        <p:nvPicPr>
+          <p:cNvPr id="3" name="그림 2"/>
+          <p:cNvPicPr>
+            <a:picLocks noChangeAspect="1"/>
+          </p:cNvPicPr>
+          <p:nvPr/>
+        </p:nvPicPr>
+        <p:blipFill rotWithShape="1">
+          <a:blip r:embed="rId2"/>
+          <a:srcRect t="10000"/>
+          <a:stretch/>
+        </p:blipFill>
+        <p:spPr>
+          <a:xfrm>
+            <a:off x="313267" y="609600"/>
+            <a:ext cx="11645538" cy="5677200"/>
+          </a:xfrm>
+          <a:prstGeom prst="rect">
+            <a:avLst/>
+          </a:prstGeom>
+          <a:ln>
+            <a:solidFill>
+              <a:schemeClr val="tx1"/>
+            </a:solidFill>
+          </a:ln>
+        </p:spPr>
+      </p:pic>
+    </p:spTree>
+    <p:extLst>
+      <p:ext uri="{BB962C8B-B14F-4D97-AF65-F5344CB8AC3E}">
+        <p14:creationId xmlns:p14="http://schemas.microsoft.com/office/powerpoint/2010/main" val="2709062093"/>
       </p:ext>
     </p:extLst>
   </p:cSld>

</xml_diff>